<commit_message>
format and refine first half content, prep charts for pptx
</commit_message>
<xml_diff>
--- a/deloitteTemplate.pptx
+++ b/deloitteTemplate.pptx
@@ -125,6 +125,9 @@
         </p15:guide>
       </p15:sldGuideLst>
     </p:ext>
+    <p:ext uri="{2D200454-40CA-4A62-9FC3-DE9A4176ACB9}">
+      <p15:notesGuideLst xmlns:p15="http://schemas.microsoft.com/office/powerpoint/2012/main"/>
+    </p:ext>
   </p:extLst>
 </p:presentation>
 </file>
@@ -223,7 +226,7 @@
           <a:p>
             <a:fld id="{B15F4A3C-38CA-40E1-85AF-B4A43759627D}" type="datetimeFigureOut">
               <a:rPr lang="en-US" smtClean="0"/>
-              <a:t>12/4/2020</a:t>
+              <a:t>1/13/2021</a:t>
             </a:fld>
             <a:endParaRPr lang="en-US"/>
           </a:p>
@@ -472,7 +475,7 @@
           <a:p>
             <a:fld id="{241EB5C9-1307-BA42-ABA2-0BC069CD8E7F}" type="datetimeFigureOut">
               <a:rPr lang="en-US" smtClean="0"/>
-              <a:t>12/4/2020</a:t>
+              <a:t>1/13/2021</a:t>
             </a:fld>
             <a:endParaRPr lang="en-US"/>
           </a:p>
@@ -2522,7 +2525,7 @@
           <a:p>
             <a:fld id="{241EB5C9-1307-BA42-ABA2-0BC069CD8E7F}" type="datetimeFigureOut">
               <a:rPr lang="en-US" smtClean="0"/>
-              <a:t>12/4/2020</a:t>
+              <a:t>1/13/2021</a:t>
             </a:fld>
             <a:endParaRPr lang="en-US"/>
           </a:p>
@@ -2700,7 +2703,7 @@
           <a:p>
             <a:fld id="{241EB5C9-1307-BA42-ABA2-0BC069CD8E7F}" type="datetimeFigureOut">
               <a:rPr lang="en-US" smtClean="0"/>
-              <a:t>12/4/2020</a:t>
+              <a:t>1/13/2021</a:t>
             </a:fld>
             <a:endParaRPr lang="en-US"/>
           </a:p>
@@ -2868,7 +2871,7 @@
           <a:p>
             <a:fld id="{241EB5C9-1307-BA42-ABA2-0BC069CD8E7F}" type="datetimeFigureOut">
               <a:rPr lang="en-US" smtClean="0"/>
-              <a:t>12/4/2020</a:t>
+              <a:t>1/13/2021</a:t>
             </a:fld>
             <a:endParaRPr lang="en-US"/>
           </a:p>
@@ -3113,7 +3116,7 @@
           <a:p>
             <a:fld id="{241EB5C9-1307-BA42-ABA2-0BC069CD8E7F}" type="datetimeFigureOut">
               <a:rPr lang="en-US" smtClean="0"/>
-              <a:t>12/4/2020</a:t>
+              <a:t>1/13/2021</a:t>
             </a:fld>
             <a:endParaRPr lang="en-US"/>
           </a:p>
@@ -3225,27 +3228,27 @@
         </p:nvSpPr>
         <p:spPr>
           <a:xfrm>
-            <a:off x="457200" y="1600200"/>
-            <a:ext cx="4038600" cy="4525963"/>
+            <a:off x="457199" y="1600201"/>
+            <a:ext cx="8229599" cy="1898374"/>
           </a:xfrm>
         </p:spPr>
         <p:txBody>
           <a:bodyPr/>
           <a:lstStyle>
             <a:lvl1pPr>
-              <a:defRPr sz="2800"/>
+              <a:defRPr sz="1600"/>
             </a:lvl1pPr>
             <a:lvl2pPr>
-              <a:defRPr sz="2400"/>
+              <a:defRPr sz="1600"/>
             </a:lvl2pPr>
             <a:lvl3pPr>
-              <a:defRPr sz="2000"/>
+              <a:defRPr sz="1600"/>
             </a:lvl3pPr>
             <a:lvl4pPr>
-              <a:defRPr sz="1800"/>
+              <a:defRPr sz="1600"/>
             </a:lvl4pPr>
             <a:lvl5pPr>
-              <a:defRPr sz="1800"/>
+              <a:defRPr sz="1600"/>
             </a:lvl5pPr>
             <a:lvl6pPr>
               <a:defRPr sz="1800"/>
@@ -3263,35 +3266,35 @@
           <a:p>
             <a:pPr lvl="0"/>
             <a:r>
-              <a:rPr lang="en-US"/>
+              <a:rPr lang="en-US" dirty="0"/>
               <a:t>Click to edit Master text styles</a:t>
             </a:r>
           </a:p>
           <a:p>
             <a:pPr lvl="1"/>
             <a:r>
-              <a:rPr lang="en-US"/>
+              <a:rPr lang="en-US" dirty="0"/>
               <a:t>Second level</a:t>
             </a:r>
           </a:p>
           <a:p>
             <a:pPr lvl="2"/>
             <a:r>
-              <a:rPr lang="en-US"/>
+              <a:rPr lang="en-US" dirty="0"/>
               <a:t>Third level</a:t>
             </a:r>
           </a:p>
           <a:p>
             <a:pPr lvl="3"/>
             <a:r>
-              <a:rPr lang="en-US"/>
+              <a:rPr lang="en-US" dirty="0"/>
               <a:t>Fourth level</a:t>
             </a:r>
           </a:p>
           <a:p>
             <a:pPr lvl="4"/>
             <a:r>
-              <a:rPr lang="en-US"/>
+              <a:rPr lang="en-US" dirty="0"/>
               <a:t>Fifth level</a:t>
             </a:r>
           </a:p>
@@ -3309,27 +3312,29 @@
         </p:nvSpPr>
         <p:spPr>
           <a:xfrm>
-            <a:off x="4648200" y="1600200"/>
-            <a:ext cx="4038600" cy="4525963"/>
+            <a:off x="457200" y="3637722"/>
+            <a:ext cx="8229600" cy="2488441"/>
           </a:xfrm>
         </p:spPr>
         <p:txBody>
-          <a:bodyPr/>
+          <a:bodyPr>
+            <a:normAutofit/>
+          </a:bodyPr>
           <a:lstStyle>
             <a:lvl1pPr>
-              <a:defRPr sz="2800"/>
+              <a:defRPr sz="1600"/>
             </a:lvl1pPr>
             <a:lvl2pPr>
-              <a:defRPr sz="2400"/>
+              <a:defRPr sz="1600"/>
             </a:lvl2pPr>
             <a:lvl3pPr>
-              <a:defRPr sz="2000"/>
+              <a:defRPr sz="1600"/>
             </a:lvl3pPr>
             <a:lvl4pPr>
-              <a:defRPr sz="1800"/>
+              <a:defRPr sz="1600"/>
             </a:lvl4pPr>
             <a:lvl5pPr>
-              <a:defRPr sz="1800"/>
+              <a:defRPr sz="1600"/>
             </a:lvl5pPr>
             <a:lvl6pPr>
               <a:defRPr sz="1800"/>
@@ -3347,35 +3352,35 @@
           <a:p>
             <a:pPr lvl="0"/>
             <a:r>
-              <a:rPr lang="en-US"/>
+              <a:rPr lang="en-US" dirty="0"/>
               <a:t>Click to edit Master text styles</a:t>
             </a:r>
           </a:p>
           <a:p>
             <a:pPr lvl="1"/>
             <a:r>
-              <a:rPr lang="en-US"/>
+              <a:rPr lang="en-US" dirty="0"/>
               <a:t>Second level</a:t>
             </a:r>
           </a:p>
           <a:p>
             <a:pPr lvl="2"/>
             <a:r>
-              <a:rPr lang="en-US"/>
+              <a:rPr lang="en-US" dirty="0"/>
               <a:t>Third level</a:t>
             </a:r>
           </a:p>
           <a:p>
             <a:pPr lvl="3"/>
             <a:r>
-              <a:rPr lang="en-US"/>
+              <a:rPr lang="en-US" dirty="0"/>
               <a:t>Fourth level</a:t>
             </a:r>
           </a:p>
           <a:p>
             <a:pPr lvl="4"/>
             <a:r>
-              <a:rPr lang="en-US"/>
+              <a:rPr lang="en-US" dirty="0"/>
               <a:t>Fifth level</a:t>
             </a:r>
           </a:p>
@@ -3398,7 +3403,7 @@
           <a:p>
             <a:fld id="{241EB5C9-1307-BA42-ABA2-0BC069CD8E7F}" type="datetimeFigureOut">
               <a:rPr lang="en-US" smtClean="0"/>
-              <a:t>12/4/2020</a:t>
+              <a:t>1/13/2021</a:t>
             </a:fld>
             <a:endParaRPr lang="en-US"/>
           </a:p>
@@ -3817,7 +3822,7 @@
           <a:p>
             <a:fld id="{241EB5C9-1307-BA42-ABA2-0BC069CD8E7F}" type="datetimeFigureOut">
               <a:rPr lang="en-US" smtClean="0"/>
-              <a:t>12/4/2020</a:t>
+              <a:t>1/13/2021</a:t>
             </a:fld>
             <a:endParaRPr lang="en-US"/>
           </a:p>
@@ -3934,7 +3939,7 @@
           <a:p>
             <a:fld id="{241EB5C9-1307-BA42-ABA2-0BC069CD8E7F}" type="datetimeFigureOut">
               <a:rPr lang="en-US" smtClean="0"/>
-              <a:t>12/4/2020</a:t>
+              <a:t>1/13/2021</a:t>
             </a:fld>
             <a:endParaRPr lang="en-US"/>
           </a:p>
@@ -4029,7 +4034,7 @@
           <a:p>
             <a:fld id="{241EB5C9-1307-BA42-ABA2-0BC069CD8E7F}" type="datetimeFigureOut">
               <a:rPr lang="en-US" smtClean="0"/>
-              <a:t>12/4/2020</a:t>
+              <a:t>1/13/2021</a:t>
             </a:fld>
             <a:endParaRPr lang="en-US"/>
           </a:p>
@@ -4304,7 +4309,7 @@
           <a:p>
             <a:fld id="{241EB5C9-1307-BA42-ABA2-0BC069CD8E7F}" type="datetimeFigureOut">
               <a:rPr lang="en-US" smtClean="0"/>
-              <a:t>12/4/2020</a:t>
+              <a:t>1/13/2021</a:t>
             </a:fld>
             <a:endParaRPr lang="en-US"/>
           </a:p>
@@ -4556,7 +4561,7 @@
           <a:p>
             <a:fld id="{241EB5C9-1307-BA42-ABA2-0BC069CD8E7F}" type="datetimeFigureOut">
               <a:rPr lang="en-US" smtClean="0"/>
-              <a:t>12/4/2020</a:t>
+              <a:t>1/13/2021</a:t>
             </a:fld>
             <a:endParaRPr lang="en-US"/>
           </a:p>
@@ -4698,35 +4703,35 @@
           <a:p>
             <a:pPr lvl="0"/>
             <a:r>
-              <a:rPr lang="en-US"/>
+              <a:rPr lang="en-US" dirty="0"/>
               <a:t>Click to edit Master text styles</a:t>
             </a:r>
           </a:p>
           <a:p>
             <a:pPr lvl="1"/>
             <a:r>
-              <a:rPr lang="en-US"/>
+              <a:rPr lang="en-US" dirty="0"/>
               <a:t>Second level</a:t>
             </a:r>
           </a:p>
           <a:p>
             <a:pPr lvl="2"/>
             <a:r>
-              <a:rPr lang="en-US"/>
+              <a:rPr lang="en-US" dirty="0"/>
               <a:t>Third level</a:t>
             </a:r>
           </a:p>
           <a:p>
             <a:pPr lvl="3"/>
             <a:r>
-              <a:rPr lang="en-US"/>
+              <a:rPr lang="en-US" dirty="0"/>
               <a:t>Fourth level</a:t>
             </a:r>
           </a:p>
           <a:p>
             <a:pPr lvl="4"/>
             <a:r>
-              <a:rPr lang="en-US"/>
+              <a:rPr lang="en-US" dirty="0"/>
               <a:t>Fifth level</a:t>
             </a:r>
           </a:p>
@@ -4767,7 +4772,7 @@
           <a:p>
             <a:fld id="{241EB5C9-1307-BA42-ABA2-0BC069CD8E7F}" type="datetimeFigureOut">
               <a:rPr lang="en-US" smtClean="0"/>
-              <a:t>12/4/2020</a:t>
+              <a:t>1/13/2021</a:t>
             </a:fld>
             <a:endParaRPr lang="en-US"/>
           </a:p>
@@ -4892,11 +4897,14 @@
     <p:bodyStyle>
       <a:lvl1pPr marL="342900" indent="-342900" algn="l" defTabSz="457200" rtl="0" eaLnBrk="1" latinLnBrk="0" hangingPunct="1">
         <a:spcBef>
-          <a:spcPct val="20000"/>
+          <a:spcPts val="600"/>
         </a:spcBef>
+        <a:spcAft>
+          <a:spcPts val="600"/>
+        </a:spcAft>
         <a:buFont typeface="Arial"/>
         <a:buChar char="•"/>
-        <a:defRPr sz="2800" kern="1200">
+        <a:defRPr sz="1600" kern="1200">
           <a:solidFill>
             <a:schemeClr val="tx1"/>
           </a:solidFill>
@@ -4907,11 +4915,14 @@
       </a:lvl1pPr>
       <a:lvl2pPr marL="742950" indent="-285750" algn="l" defTabSz="457200" rtl="0" eaLnBrk="1" latinLnBrk="0" hangingPunct="1">
         <a:spcBef>
-          <a:spcPct val="20000"/>
+          <a:spcPts val="600"/>
         </a:spcBef>
+        <a:spcAft>
+          <a:spcPts val="600"/>
+        </a:spcAft>
         <a:buFont typeface="Arial"/>
         <a:buChar char="–"/>
-        <a:defRPr sz="2400" kern="1200">
+        <a:defRPr sz="1600" kern="1200">
           <a:solidFill>
             <a:schemeClr val="tx1"/>
           </a:solidFill>
@@ -4922,11 +4933,14 @@
       </a:lvl2pPr>
       <a:lvl3pPr marL="1143000" indent="-228600" algn="l" defTabSz="457200" rtl="0" eaLnBrk="1" latinLnBrk="0" hangingPunct="1">
         <a:spcBef>
-          <a:spcPct val="20000"/>
+          <a:spcPts val="600"/>
         </a:spcBef>
+        <a:spcAft>
+          <a:spcPts val="600"/>
+        </a:spcAft>
         <a:buFont typeface="Arial"/>
         <a:buChar char="•"/>
-        <a:defRPr sz="2000" kern="1200">
+        <a:defRPr sz="1600" kern="1200">
           <a:solidFill>
             <a:schemeClr val="tx1"/>
           </a:solidFill>
@@ -4937,11 +4951,14 @@
       </a:lvl3pPr>
       <a:lvl4pPr marL="1600200" indent="-228600" algn="l" defTabSz="457200" rtl="0" eaLnBrk="1" latinLnBrk="0" hangingPunct="1">
         <a:spcBef>
-          <a:spcPct val="20000"/>
+          <a:spcPts val="600"/>
         </a:spcBef>
+        <a:spcAft>
+          <a:spcPts val="600"/>
+        </a:spcAft>
         <a:buFont typeface="Arial"/>
         <a:buChar char="–"/>
-        <a:defRPr sz="1800" kern="1200">
+        <a:defRPr sz="1600" kern="1200">
           <a:solidFill>
             <a:schemeClr val="tx1"/>
           </a:solidFill>
@@ -4952,11 +4969,14 @@
       </a:lvl4pPr>
       <a:lvl5pPr marL="2057400" indent="-228600" algn="l" defTabSz="457200" rtl="0" eaLnBrk="1" latinLnBrk="0" hangingPunct="1">
         <a:spcBef>
-          <a:spcPct val="20000"/>
+          <a:spcPts val="600"/>
         </a:spcBef>
+        <a:spcAft>
+          <a:spcPts val="600"/>
+        </a:spcAft>
         <a:buFont typeface="Arial"/>
         <a:buChar char="»"/>
-        <a:defRPr sz="1800" kern="1200">
+        <a:defRPr sz="1600" kern="1200">
           <a:solidFill>
             <a:schemeClr val="tx1"/>
           </a:solidFill>

</xml_diff>